<commit_message>
docs:add cms install guide
</commit_message>
<xml_diff>
--- a/docs/0.aws-setup.pptx
+++ b/docs/0.aws-setup.pptx
@@ -229,7 +229,7 @@
           <a:p>
             <a:fld id="{A9D9897E-559B-4802-87FD-BDDBC21CBABC}" type="datetimeFigureOut">
               <a:rPr lang="ko-KR" altLang="en-US" smtClean="0"/>
-              <a:t>2020-03-06</a:t>
+              <a:t>2020-03-07</a:t>
             </a:fld>
             <a:endParaRPr lang="ko-KR" altLang="en-US"/>
           </a:p>
@@ -2631,7 +2631,7 @@
           <a:p>
             <a:fld id="{64092F82-702E-4C8C-A80A-9400EA289A4F}" type="datetime1">
               <a:rPr lang="ko-KR" altLang="en-US" smtClean="0"/>
-              <a:t>2020-03-06</a:t>
+              <a:t>2020-03-07</a:t>
             </a:fld>
             <a:endParaRPr lang="ko-KR" altLang="en-US"/>
           </a:p>
@@ -2834,7 +2834,7 @@
           <a:p>
             <a:fld id="{7735458F-B027-40BA-95F5-1DEAEC46A3F0}" type="datetime1">
               <a:rPr lang="ko-KR" altLang="en-US" smtClean="0"/>
-              <a:t>2020-03-06</a:t>
+              <a:t>2020-03-07</a:t>
             </a:fld>
             <a:endParaRPr lang="ko-KR" altLang="en-US"/>
           </a:p>
@@ -3027,7 +3027,7 @@
           <a:p>
             <a:fld id="{7EAF3A9B-8C19-44DA-B705-4B807995FE2E}" type="datetime1">
               <a:rPr lang="ko-KR" altLang="en-US" smtClean="0"/>
-              <a:t>2020-03-06</a:t>
+              <a:t>2020-03-07</a:t>
             </a:fld>
             <a:endParaRPr lang="ko-KR" altLang="en-US"/>
           </a:p>
@@ -3380,7 +3380,7 @@
           <a:p>
             <a:fld id="{D91EB34D-63DB-4738-97A2-41FB47B29709}" type="datetime1">
               <a:rPr lang="ko-KR" altLang="en-US" smtClean="0"/>
-              <a:t>2020-03-06</a:t>
+              <a:t>2020-03-07</a:t>
             </a:fld>
             <a:endParaRPr lang="ko-KR" altLang="en-US"/>
           </a:p>
@@ -3731,7 +3731,7 @@
           <a:p>
             <a:fld id="{6FB4A53D-03B9-4821-83CE-E8A6455D160B}" type="datetime1">
               <a:rPr lang="ko-KR" altLang="en-US" smtClean="0"/>
-              <a:t>2020-03-06</a:t>
+              <a:t>2020-03-07</a:t>
             </a:fld>
             <a:endParaRPr lang="ko-KR" altLang="en-US"/>
           </a:p>
@@ -3981,7 +3981,7 @@
           <a:p>
             <a:fld id="{DABC5422-0199-4429-A48D-84F5DA31BD5B}" type="datetime1">
               <a:rPr lang="ko-KR" altLang="en-US" smtClean="0"/>
-              <a:t>2020-03-06</a:t>
+              <a:t>2020-03-07</a:t>
             </a:fld>
             <a:endParaRPr lang="ko-KR" altLang="en-US"/>
           </a:p>
@@ -4225,7 +4225,7 @@
           <a:p>
             <a:fld id="{0131B350-7602-433F-A4A8-8FACAF1B9283}" type="datetime1">
               <a:rPr lang="ko-KR" altLang="en-US" smtClean="0"/>
-              <a:t>2020-03-06</a:t>
+              <a:t>2020-03-07</a:t>
             </a:fld>
             <a:endParaRPr lang="ko-KR" altLang="en-US"/>
           </a:p>
@@ -4428,7 +4428,7 @@
           <a:p>
             <a:fld id="{CD81DC56-A0B0-4C36-8167-6120BCC752B3}" type="datetime1">
               <a:rPr lang="ko-KR" altLang="en-US" smtClean="0"/>
-              <a:t>2020-03-06</a:t>
+              <a:t>2020-03-07</a:t>
             </a:fld>
             <a:endParaRPr lang="ko-KR" altLang="en-US"/>
           </a:p>
@@ -4534,7 +4534,7 @@
           <a:p>
             <a:fld id="{12D703F0-D5C1-49B6-8AF9-61D879FD942E}" type="datetime1">
               <a:rPr lang="ko-KR" altLang="en-US" smtClean="0"/>
-              <a:t>2020-03-06</a:t>
+              <a:t>2020-03-07</a:t>
             </a:fld>
             <a:endParaRPr lang="ko-KR" altLang="en-US"/>
           </a:p>
@@ -4678,7 +4678,7 @@
           <a:p>
             <a:fld id="{F0BBD628-E5CA-45EF-95FF-7712AEF52FA5}" type="datetime1">
               <a:rPr lang="ko-KR" altLang="en-US" smtClean="0"/>
-              <a:t>2020-03-06</a:t>
+              <a:t>2020-03-07</a:t>
             </a:fld>
             <a:endParaRPr lang="ko-KR" altLang="en-US"/>
           </a:p>
@@ -5204,7 +5204,7 @@
           <a:p>
             <a:fld id="{E9F71E00-86D1-4644-91AD-E74F83A79577}" type="datetime1">
               <a:rPr lang="ko-KR" altLang="en-US" smtClean="0"/>
-              <a:t>2020-03-06</a:t>
+              <a:t>2020-03-07</a:t>
             </a:fld>
             <a:endParaRPr lang="ko-KR" altLang="en-US"/>
           </a:p>
@@ -5473,7 +5473,7 @@
           <a:p>
             <a:fld id="{0DF9718C-3FF5-4BE4-944B-DBF99DCCD3E1}" type="datetime1">
               <a:rPr lang="ko-KR" altLang="en-US" smtClean="0"/>
-              <a:t>2020-03-06</a:t>
+              <a:t>2020-03-07</a:t>
             </a:fld>
             <a:endParaRPr lang="ko-KR" altLang="en-US"/>
           </a:p>
@@ -6121,28 +6121,20 @@
               <a:t>Lightsail</a:t>
             </a:r>
             <a:r>
+              <a:rPr lang="en-US" altLang="ko-KR" sz="2800" dirty="0">
+                <a:solidFill>
+                  <a:srgbClr val="FF0000"/>
+                </a:solidFill>
+              </a:rPr>
+              <a:t> </a:t>
+            </a:r>
+            <a:r>
               <a:rPr lang="ko-KR" altLang="en-US" sz="2800" dirty="0">
                 <a:solidFill>
                   <a:srgbClr val="FF0000"/>
                 </a:solidFill>
               </a:rPr>
-              <a:t>에 </a:t>
-            </a:r>
-            <a:r>
-              <a:rPr lang="en-US" altLang="ko-KR" sz="2800" dirty="0">
-                <a:solidFill>
-                  <a:srgbClr val="FF0000"/>
-                </a:solidFill>
-              </a:rPr>
-              <a:t>CMS </a:t>
-            </a:r>
-            <a:r>
-              <a:rPr lang="ko-KR" altLang="en-US" sz="2800" dirty="0">
-                <a:solidFill>
-                  <a:srgbClr val="FF0000"/>
-                </a:solidFill>
-              </a:rPr>
-              <a:t>구동하기</a:t>
+              <a:t>인스턴스 구축</a:t>
             </a:r>
             <a:endParaRPr lang="ko-KR" altLang="en-US" sz="2800" dirty="0">
               <a:solidFill>

</xml_diff>

<commit_message>
docs: update aws setup pptx
</commit_message>
<xml_diff>
--- a/docs/0.aws-setup.pptx
+++ b/docs/0.aws-setup.pptx
@@ -9853,7 +9853,7 @@
         <p:spPr>
           <a:xfrm>
             <a:off x="609600" y="1589567"/>
-            <a:ext cx="2810272" cy="4572000"/>
+            <a:ext cx="8210872" cy="1623409"/>
           </a:xfrm>
           <a:prstGeom prst="rect">
             <a:avLst/>
@@ -9873,9 +9873,79 @@
               <a:buChar char="-"/>
             </a:pPr>
             <a:r>
-              <a:rPr lang="ko-KR" altLang="en-US" dirty="0"/>
-              <a:t>비용을 고려하여 서버 구성을 지정</a:t>
-            </a:r>
+              <a:rPr lang="ko-KR" altLang="en-US" sz="1600" dirty="0"/>
+              <a:t>비용을 고려하여 서버 </a:t>
+            </a:r>
+            <a:r>
+              <a:rPr lang="ko-KR" altLang="en-US" sz="1600"/>
+              <a:t>구성을 지정</a:t>
+            </a:r>
+            <a:endParaRPr lang="en-US" altLang="ko-KR" sz="1600"/>
+          </a:p>
+          <a:p>
+            <a:pPr marL="285750" indent="-285750" latinLnBrk="0">
+              <a:spcAft>
+                <a:spcPts val="600"/>
+              </a:spcAft>
+              <a:buFontTx/>
+              <a:buChar char="-"/>
+            </a:pPr>
+            <a:r>
+              <a:rPr lang="ko-KR" altLang="en-US" sz="1600"/>
+              <a:t>메모리</a:t>
+            </a:r>
+            <a:r>
+              <a:rPr lang="en-US" altLang="ko-KR" sz="1600"/>
+              <a:t>/</a:t>
+            </a:r>
+            <a:r>
+              <a:rPr lang="ko-KR" altLang="en-US" sz="1600"/>
+              <a:t>디스크 공간 부족으로 에러가 발생할 수 있으니 최소 아래 사양 권장</a:t>
+            </a:r>
+            <a:endParaRPr lang="en-US" altLang="ko-KR" sz="1600"/>
+          </a:p>
+          <a:p>
+            <a:pPr marL="742950" lvl="1" indent="-285750" latinLnBrk="0">
+              <a:spcAft>
+                <a:spcPts val="600"/>
+              </a:spcAft>
+              <a:buFontTx/>
+              <a:buChar char="-"/>
+            </a:pPr>
+            <a:r>
+              <a:rPr lang="ko-KR" altLang="en-US" sz="1600"/>
+              <a:t>메모리</a:t>
+            </a:r>
+            <a:r>
+              <a:rPr lang="en-US" altLang="ko-KR" sz="1600"/>
+              <a:t>: 2GB</a:t>
+            </a:r>
+          </a:p>
+          <a:p>
+            <a:pPr marL="742950" lvl="1" indent="-285750" latinLnBrk="0">
+              <a:spcAft>
+                <a:spcPts val="600"/>
+              </a:spcAft>
+              <a:buFontTx/>
+              <a:buChar char="-"/>
+            </a:pPr>
+            <a:r>
+              <a:rPr lang="ko-KR" altLang="en-US" sz="1600"/>
+              <a:t>디스크</a:t>
+            </a:r>
+            <a:r>
+              <a:rPr lang="en-US" altLang="ko-KR" sz="1600"/>
+              <a:t>: 50GB</a:t>
+            </a:r>
+          </a:p>
+          <a:p>
+            <a:pPr marL="285750" indent="-285750" latinLnBrk="0">
+              <a:spcAft>
+                <a:spcPts val="600"/>
+              </a:spcAft>
+              <a:buFontTx/>
+              <a:buChar char="-"/>
+            </a:pPr>
             <a:endParaRPr lang="en-US" altLang="ko-KR" dirty="0"/>
           </a:p>
         </p:txBody>
@@ -9902,7 +9972,7 @@
         </p:blipFill>
         <p:spPr>
           <a:xfrm>
-            <a:off x="3619901" y="2348880"/>
+            <a:off x="1835696" y="4149284"/>
             <a:ext cx="5143099" cy="2598682"/>
           </a:xfrm>
           <a:prstGeom prst="rect">

</xml_diff>